<commit_message>
adding simple filter to script
</commit_message>
<xml_diff>
--- a/RubocopYourChanges.pptx
+++ b/RubocopYourChanges.pptx
@@ -12643,7 +12643,6 @@
               <a:rPr lang="en-US" sz="1600" dirty="0"/>
               <a:t> -h</a:t>
             </a:r>
-            <a:endParaRPr lang="en-US" sz="1600" dirty="0"/>
           </a:p>
           <a:p>
             <a:pPr marL="400050" lvl="1" indent="0">
@@ -12778,7 +12777,15 @@
             </a:pPr>
             <a:r>
               <a:rPr lang="en-US" sz="1600" dirty="0"/>
-              <a:t>    --help     display help info</a:t>
+              <a:t>    --help    </a:t>
+            </a:r>
+            <a:r>
+              <a:rPr lang="en-US" sz="1600" dirty="0" smtClean="0"/>
+              <a:t>    </a:t>
+            </a:r>
+            <a:r>
+              <a:rPr lang="en-US" sz="1600" dirty="0"/>
+              <a:t>display help info</a:t>
             </a:r>
           </a:p>
           <a:p>
@@ -12797,7 +12804,6 @@
               <a:rPr lang="en-US" sz="1600" dirty="0"/>
               <a:t> master</a:t>
             </a:r>
-            <a:endParaRPr lang="en-US" sz="1600" dirty="0"/>
           </a:p>
         </p:txBody>
       </p:sp>
@@ -13506,11 +13512,7 @@
             </a:r>
             <a:r>
               <a:rPr lang="en-US" sz="2000" dirty="0" smtClean="0"/>
-              <a:t>int (ruby </a:t>
-            </a:r>
-            <a:r>
-              <a:rPr lang="en-US" sz="2000" dirty="0" smtClean="0"/>
-              <a:t>syntax checks, </a:t>
+              <a:t>int (ruby syntax checks, </a:t>
             </a:r>
             <a:r>
               <a:rPr lang="en-US" sz="2000" dirty="0" err="1" smtClean="0"/>
@@ -13520,7 +13522,6 @@
               <a:rPr lang="en-US" sz="2000" dirty="0" smtClean="0"/>
               <a:t>)</a:t>
             </a:r>
-            <a:endParaRPr lang="en-US" sz="2000" dirty="0" smtClean="0"/>
           </a:p>
           <a:p>
             <a:r>
@@ -13699,11 +13700,7 @@
             </a:pPr>
             <a:r>
               <a:rPr lang="en-US" sz="1600" dirty="0" smtClean="0"/>
-              <a:t>Scan </a:t>
-            </a:r>
-            <a:r>
-              <a:rPr lang="en-US" sz="1600" dirty="0" smtClean="0"/>
-              <a:t>all of the ruby files in your project directory.</a:t>
+              <a:t>Scan all of the ruby files in your project directory.</a:t>
             </a:r>
           </a:p>
           <a:p>

</xml_diff>